<commit_message>
add commentd for revision
</commit_message>
<xml_diff>
--- a/fig/overview.pptx
+++ b/fig/overview.pptx
@@ -7,6 +7,7 @@
   <p:sldIdLst>
     <p:sldId id="256" r:id="rId2"/>
     <p:sldId id="257" r:id="rId3"/>
+    <p:sldId id="258" r:id="rId4"/>
   </p:sldIdLst>
   <p:sldSz cx="16513175" cy="6858000"/>
   <p:notesSz cx="6858000" cy="9144000"/>
@@ -244,7 +245,7 @@
           <a:p>
             <a:fld id="{AE461D9D-3ED4-1345-AA6A-FA522C09250F}" type="datetimeFigureOut">
               <a:rPr lang="en-US" smtClean="0"/>
-              <a:t>12/29/2021</a:t>
+              <a:t>1/3/22</a:t>
             </a:fld>
             <a:endParaRPr lang="en-US"/>
           </a:p>
@@ -414,7 +415,7 @@
           <a:p>
             <a:fld id="{AE461D9D-3ED4-1345-AA6A-FA522C09250F}" type="datetimeFigureOut">
               <a:rPr lang="en-US" smtClean="0"/>
-              <a:t>12/29/2021</a:t>
+              <a:t>1/3/22</a:t>
             </a:fld>
             <a:endParaRPr lang="en-US"/>
           </a:p>
@@ -594,7 +595,7 @@
           <a:p>
             <a:fld id="{AE461D9D-3ED4-1345-AA6A-FA522C09250F}" type="datetimeFigureOut">
               <a:rPr lang="en-US" smtClean="0"/>
-              <a:t>12/29/2021</a:t>
+              <a:t>1/3/22</a:t>
             </a:fld>
             <a:endParaRPr lang="en-US"/>
           </a:p>
@@ -764,7 +765,7 @@
           <a:p>
             <a:fld id="{AE461D9D-3ED4-1345-AA6A-FA522C09250F}" type="datetimeFigureOut">
               <a:rPr lang="en-US" smtClean="0"/>
-              <a:t>12/29/2021</a:t>
+              <a:t>1/3/22</a:t>
             </a:fld>
             <a:endParaRPr lang="en-US"/>
           </a:p>
@@ -1010,7 +1011,7 @@
           <a:p>
             <a:fld id="{AE461D9D-3ED4-1345-AA6A-FA522C09250F}" type="datetimeFigureOut">
               <a:rPr lang="en-US" smtClean="0"/>
-              <a:t>12/29/2021</a:t>
+              <a:t>1/3/22</a:t>
             </a:fld>
             <a:endParaRPr lang="en-US"/>
           </a:p>
@@ -1242,7 +1243,7 @@
           <a:p>
             <a:fld id="{AE461D9D-3ED4-1345-AA6A-FA522C09250F}" type="datetimeFigureOut">
               <a:rPr lang="en-US" smtClean="0"/>
-              <a:t>12/29/2021</a:t>
+              <a:t>1/3/22</a:t>
             </a:fld>
             <a:endParaRPr lang="en-US"/>
           </a:p>
@@ -1609,7 +1610,7 @@
           <a:p>
             <a:fld id="{AE461D9D-3ED4-1345-AA6A-FA522C09250F}" type="datetimeFigureOut">
               <a:rPr lang="en-US" smtClean="0"/>
-              <a:t>12/29/2021</a:t>
+              <a:t>1/3/22</a:t>
             </a:fld>
             <a:endParaRPr lang="en-US"/>
           </a:p>
@@ -1727,7 +1728,7 @@
           <a:p>
             <a:fld id="{AE461D9D-3ED4-1345-AA6A-FA522C09250F}" type="datetimeFigureOut">
               <a:rPr lang="en-US" smtClean="0"/>
-              <a:t>12/29/2021</a:t>
+              <a:t>1/3/22</a:t>
             </a:fld>
             <a:endParaRPr lang="en-US"/>
           </a:p>
@@ -1822,7 +1823,7 @@
           <a:p>
             <a:fld id="{AE461D9D-3ED4-1345-AA6A-FA522C09250F}" type="datetimeFigureOut">
               <a:rPr lang="en-US" smtClean="0"/>
-              <a:t>12/29/2021</a:t>
+              <a:t>1/3/22</a:t>
             </a:fld>
             <a:endParaRPr lang="en-US"/>
           </a:p>
@@ -2099,7 +2100,7 @@
           <a:p>
             <a:fld id="{AE461D9D-3ED4-1345-AA6A-FA522C09250F}" type="datetimeFigureOut">
               <a:rPr lang="en-US" smtClean="0"/>
-              <a:t>12/29/2021</a:t>
+              <a:t>1/3/22</a:t>
             </a:fld>
             <a:endParaRPr lang="en-US"/>
           </a:p>
@@ -2356,7 +2357,7 @@
           <a:p>
             <a:fld id="{AE461D9D-3ED4-1345-AA6A-FA522C09250F}" type="datetimeFigureOut">
               <a:rPr lang="en-US" smtClean="0"/>
-              <a:t>12/29/2021</a:t>
+              <a:t>1/3/22</a:t>
             </a:fld>
             <a:endParaRPr lang="en-US"/>
           </a:p>
@@ -2569,7 +2570,7 @@
           <a:p>
             <a:fld id="{AE461D9D-3ED4-1345-AA6A-FA522C09250F}" type="datetimeFigureOut">
               <a:rPr lang="en-US" smtClean="0"/>
-              <a:t>12/29/2021</a:t>
+              <a:t>1/3/22</a:t>
             </a:fld>
             <a:endParaRPr lang="en-US"/>
           </a:p>
@@ -5322,6 +5323,1251 @@
 </p:sld>
 </file>
 
+<file path=ppt/slides/slide3.xml><?xml version="1.0" encoding="utf-8"?>
+<p:sld xmlns:a="http://schemas.openxmlformats.org/drawingml/2006/main" xmlns:r="http://schemas.openxmlformats.org/officeDocument/2006/relationships" xmlns:p="http://schemas.openxmlformats.org/presentationml/2006/main">
+  <p:cSld>
+    <p:spTree>
+      <p:nvGrpSpPr>
+        <p:cNvPr id="1" name=""/>
+        <p:cNvGrpSpPr/>
+        <p:nvPr/>
+      </p:nvGrpSpPr>
+      <p:grpSpPr>
+        <a:xfrm>
+          <a:off x="0" y="0"/>
+          <a:ext cx="0" cy="0"/>
+          <a:chOff x="0" y="0"/>
+          <a:chExt cx="0" cy="0"/>
+        </a:xfrm>
+      </p:grpSpPr>
+      <p:sp>
+        <p:nvSpPr>
+          <p:cNvPr id="43" name="Rounded Rectangle 42">
+            <a:extLst>
+              <a:ext uri="{FF2B5EF4-FFF2-40B4-BE49-F238E27FC236}">
+                <a16:creationId xmlns:a16="http://schemas.microsoft.com/office/drawing/2014/main" id="{5A488113-AECA-EF46-904A-56F78EF44FD2}"/>
+              </a:ext>
+            </a:extLst>
+          </p:cNvPr>
+          <p:cNvSpPr/>
+          <p:nvPr/>
+        </p:nvSpPr>
+        <p:spPr>
+          <a:xfrm>
+            <a:off x="4554578" y="1716011"/>
+            <a:ext cx="1962349" cy="3548774"/>
+          </a:xfrm>
+          <a:prstGeom prst="roundRect">
+            <a:avLst>
+              <a:gd name="adj" fmla="val 7028"/>
+            </a:avLst>
+          </a:prstGeom>
+          <a:noFill/>
+          <a:ln w="12700">
+            <a:solidFill>
+              <a:schemeClr val="tx1"/>
+            </a:solidFill>
+            <a:prstDash val="dash"/>
+          </a:ln>
+        </p:spPr>
+        <p:style>
+          <a:lnRef idx="2">
+            <a:schemeClr val="accent1">
+              <a:shade val="50000"/>
+            </a:schemeClr>
+          </a:lnRef>
+          <a:fillRef idx="1">
+            <a:schemeClr val="accent1"/>
+          </a:fillRef>
+          <a:effectRef idx="0">
+            <a:schemeClr val="accent1"/>
+          </a:effectRef>
+          <a:fontRef idx="minor">
+            <a:schemeClr val="lt1"/>
+          </a:fontRef>
+        </p:style>
+        <p:txBody>
+          <a:bodyPr rtlCol="0" anchor="ctr"/>
+          <a:lstStyle/>
+          <a:p>
+            <a:pPr algn="ctr"/>
+            <a:endParaRPr lang="en-US"/>
+          </a:p>
+        </p:txBody>
+      </p:sp>
+      <p:sp>
+        <p:nvSpPr>
+          <p:cNvPr id="4" name="Round Diagonal Corner Rectangle 3">
+            <a:extLst>
+              <a:ext uri="{FF2B5EF4-FFF2-40B4-BE49-F238E27FC236}">
+                <a16:creationId xmlns:a16="http://schemas.microsoft.com/office/drawing/2014/main" id="{209C59D9-01A5-5E48-8DA4-D4D352B7B490}"/>
+              </a:ext>
+            </a:extLst>
+          </p:cNvPr>
+          <p:cNvSpPr/>
+          <p:nvPr/>
+        </p:nvSpPr>
+        <p:spPr>
+          <a:xfrm>
+            <a:off x="2971904" y="3036725"/>
+            <a:ext cx="1062516" cy="543481"/>
+          </a:xfrm>
+          <a:prstGeom prst="round2DiagRect">
+            <a:avLst/>
+          </a:prstGeom>
+          <a:noFill/>
+          <a:ln w="12700">
+            <a:solidFill>
+              <a:schemeClr val="tx1"/>
+            </a:solidFill>
+          </a:ln>
+        </p:spPr>
+        <p:style>
+          <a:lnRef idx="2">
+            <a:schemeClr val="accent1">
+              <a:shade val="50000"/>
+            </a:schemeClr>
+          </a:lnRef>
+          <a:fillRef idx="1">
+            <a:schemeClr val="accent1"/>
+          </a:fillRef>
+          <a:effectRef idx="0">
+            <a:schemeClr val="accent1"/>
+          </a:effectRef>
+          <a:fontRef idx="minor">
+            <a:schemeClr val="lt1"/>
+          </a:fontRef>
+        </p:style>
+        <p:txBody>
+          <a:bodyPr rot="0" spcFirstLastPara="0" vertOverflow="overflow" horzOverflow="overflow" vert="horz" wrap="square" lIns="91440" tIns="45720" rIns="91440" bIns="45720" numCol="1" spcCol="0" rtlCol="0" fromWordArt="0" anchor="ctr" anchorCtr="0" forceAA="0" compatLnSpc="1">
+            <a:prstTxWarp prst="textNoShape">
+              <a:avLst/>
+            </a:prstTxWarp>
+            <a:noAutofit/>
+          </a:bodyPr>
+          <a:lstStyle/>
+          <a:p>
+            <a:pPr algn="ctr"/>
+            <a:r>
+              <a:rPr lang="en-US" dirty="0">
+                <a:solidFill>
+                  <a:schemeClr val="tx1"/>
+                </a:solidFill>
+              </a:rPr>
+              <a:t>CVE ID</a:t>
+            </a:r>
+          </a:p>
+        </p:txBody>
+      </p:sp>
+      <p:sp>
+        <p:nvSpPr>
+          <p:cNvPr id="5" name="Round Diagonal Corner Rectangle 4">
+            <a:extLst>
+              <a:ext uri="{FF2B5EF4-FFF2-40B4-BE49-F238E27FC236}">
+                <a16:creationId xmlns:a16="http://schemas.microsoft.com/office/drawing/2014/main" id="{2DC2A51B-B557-2F43-B9CC-223406FB27CE}"/>
+              </a:ext>
+            </a:extLst>
+          </p:cNvPr>
+          <p:cNvSpPr/>
+          <p:nvPr/>
+        </p:nvSpPr>
+        <p:spPr>
+          <a:xfrm>
+            <a:off x="11502383" y="3036729"/>
+            <a:ext cx="1151678" cy="543481"/>
+          </a:xfrm>
+          <a:prstGeom prst="round2DiagRect">
+            <a:avLst/>
+          </a:prstGeom>
+          <a:noFill/>
+          <a:ln w="12700">
+            <a:solidFill>
+              <a:schemeClr val="tx1"/>
+            </a:solidFill>
+          </a:ln>
+        </p:spPr>
+        <p:style>
+          <a:lnRef idx="2">
+            <a:schemeClr val="accent1">
+              <a:shade val="50000"/>
+            </a:schemeClr>
+          </a:lnRef>
+          <a:fillRef idx="1">
+            <a:schemeClr val="accent1"/>
+          </a:fillRef>
+          <a:effectRef idx="0">
+            <a:schemeClr val="accent1"/>
+          </a:effectRef>
+          <a:fontRef idx="minor">
+            <a:schemeClr val="lt1"/>
+          </a:fontRef>
+        </p:style>
+        <p:txBody>
+          <a:bodyPr rot="0" spcFirstLastPara="0" vertOverflow="overflow" horzOverflow="overflow" vert="horz" wrap="square" lIns="91440" tIns="45720" rIns="91440" bIns="45720" numCol="1" spcCol="0" rtlCol="0" fromWordArt="0" anchor="ctr" anchorCtr="0" forceAA="0" compatLnSpc="1">
+            <a:prstTxWarp prst="textNoShape">
+              <a:avLst/>
+            </a:prstTxWarp>
+            <a:noAutofit/>
+          </a:bodyPr>
+          <a:lstStyle/>
+          <a:p>
+            <a:pPr algn="ctr"/>
+            <a:r>
+              <a:rPr lang="zh-CN" altLang="en-US" dirty="0">
+                <a:solidFill>
+                  <a:schemeClr val="tx1"/>
+                </a:solidFill>
+              </a:rPr>
+              <a:t>补丁列表</a:t>
+            </a:r>
+            <a:endParaRPr lang="en-US" dirty="0">
+              <a:solidFill>
+                <a:schemeClr val="tx1"/>
+              </a:solidFill>
+            </a:endParaRPr>
+          </a:p>
+        </p:txBody>
+      </p:sp>
+      <p:sp>
+        <p:nvSpPr>
+          <p:cNvPr id="6" name="Rounded Rectangle 5">
+            <a:extLst>
+              <a:ext uri="{FF2B5EF4-FFF2-40B4-BE49-F238E27FC236}">
+                <a16:creationId xmlns:a16="http://schemas.microsoft.com/office/drawing/2014/main" id="{6D093B29-B815-524D-8FB2-52E26776263D}"/>
+              </a:ext>
+            </a:extLst>
+          </p:cNvPr>
+          <p:cNvSpPr/>
+          <p:nvPr/>
+        </p:nvSpPr>
+        <p:spPr>
+          <a:xfrm>
+            <a:off x="4821728" y="1916545"/>
+            <a:ext cx="1443037" cy="772083"/>
+          </a:xfrm>
+          <a:prstGeom prst="roundRect">
+            <a:avLst/>
+          </a:prstGeom>
+          <a:noFill/>
+          <a:ln w="12700">
+            <a:solidFill>
+              <a:schemeClr val="tx1"/>
+            </a:solidFill>
+          </a:ln>
+        </p:spPr>
+        <p:style>
+          <a:lnRef idx="2">
+            <a:schemeClr val="accent1">
+              <a:shade val="50000"/>
+            </a:schemeClr>
+          </a:lnRef>
+          <a:fillRef idx="1">
+            <a:schemeClr val="accent1"/>
+          </a:fillRef>
+          <a:effectRef idx="0">
+            <a:schemeClr val="accent1"/>
+          </a:effectRef>
+          <a:fontRef idx="minor">
+            <a:schemeClr val="lt1"/>
+          </a:fontRef>
+        </p:style>
+        <p:txBody>
+          <a:bodyPr rot="0" spcFirstLastPara="0" vertOverflow="overflow" horzOverflow="overflow" vert="horz" wrap="square" lIns="91440" tIns="45720" rIns="91440" bIns="45720" numCol="1" spcCol="0" rtlCol="0" fromWordArt="0" anchor="ctr" anchorCtr="0" forceAA="0" compatLnSpc="1">
+            <a:prstTxWarp prst="textNoShape">
+              <a:avLst/>
+            </a:prstTxWarp>
+            <a:noAutofit/>
+          </a:bodyPr>
+          <a:lstStyle/>
+          <a:p>
+            <a:pPr algn="ctr"/>
+            <a:r>
+              <a:rPr lang="zh-CN" altLang="en-US" dirty="0">
+                <a:solidFill>
+                  <a:schemeClr val="tx1"/>
+                </a:solidFill>
+              </a:rPr>
+              <a:t>公告分析</a:t>
+            </a:r>
+            <a:endParaRPr lang="en-US" dirty="0">
+              <a:solidFill>
+                <a:schemeClr val="tx1"/>
+              </a:solidFill>
+            </a:endParaRPr>
+          </a:p>
+        </p:txBody>
+      </p:sp>
+      <p:sp>
+        <p:nvSpPr>
+          <p:cNvPr id="7" name="Rounded Rectangle 6">
+            <a:extLst>
+              <a:ext uri="{FF2B5EF4-FFF2-40B4-BE49-F238E27FC236}">
+                <a16:creationId xmlns:a16="http://schemas.microsoft.com/office/drawing/2014/main" id="{AFCF1E98-22F9-E745-8C91-B70E2D17F0F9}"/>
+              </a:ext>
+            </a:extLst>
+          </p:cNvPr>
+          <p:cNvSpPr/>
+          <p:nvPr/>
+        </p:nvSpPr>
+        <p:spPr>
+          <a:xfrm>
+            <a:off x="4838052" y="2903509"/>
+            <a:ext cx="1443037" cy="772083"/>
+          </a:xfrm>
+          <a:prstGeom prst="roundRect">
+            <a:avLst/>
+          </a:prstGeom>
+          <a:noFill/>
+          <a:ln w="12700">
+            <a:solidFill>
+              <a:schemeClr val="tx1"/>
+            </a:solidFill>
+          </a:ln>
+        </p:spPr>
+        <p:style>
+          <a:lnRef idx="2">
+            <a:schemeClr val="accent1">
+              <a:shade val="50000"/>
+            </a:schemeClr>
+          </a:lnRef>
+          <a:fillRef idx="1">
+            <a:schemeClr val="accent1"/>
+          </a:fillRef>
+          <a:effectRef idx="0">
+            <a:schemeClr val="accent1"/>
+          </a:effectRef>
+          <a:fontRef idx="minor">
+            <a:schemeClr val="lt1"/>
+          </a:fontRef>
+        </p:style>
+        <p:txBody>
+          <a:bodyPr rot="0" spcFirstLastPara="0" vertOverflow="overflow" horzOverflow="overflow" vert="horz" wrap="square" lIns="91440" tIns="45720" rIns="91440" bIns="45720" numCol="1" spcCol="0" rtlCol="0" fromWordArt="0" anchor="ctr" anchorCtr="0" forceAA="0" compatLnSpc="1">
+            <a:prstTxWarp prst="textNoShape">
+              <a:avLst/>
+            </a:prstTxWarp>
+            <a:noAutofit/>
+          </a:bodyPr>
+          <a:lstStyle/>
+          <a:p>
+            <a:pPr algn="ctr"/>
+            <a:r>
+              <a:rPr lang="zh-CN" altLang="en-US" dirty="0">
+                <a:solidFill>
+                  <a:schemeClr val="tx1"/>
+                </a:solidFill>
+              </a:rPr>
+              <a:t>引用分析</a:t>
+            </a:r>
+            <a:endParaRPr lang="en-US" dirty="0">
+              <a:solidFill>
+                <a:schemeClr val="tx1"/>
+              </a:solidFill>
+            </a:endParaRPr>
+          </a:p>
+        </p:txBody>
+      </p:sp>
+      <p:sp>
+        <p:nvSpPr>
+          <p:cNvPr id="8" name="Rounded Rectangle 7">
+            <a:extLst>
+              <a:ext uri="{FF2B5EF4-FFF2-40B4-BE49-F238E27FC236}">
+                <a16:creationId xmlns:a16="http://schemas.microsoft.com/office/drawing/2014/main" id="{F8854CFF-C541-4143-869B-72DE9196A4C8}"/>
+              </a:ext>
+            </a:extLst>
+          </p:cNvPr>
+          <p:cNvSpPr/>
+          <p:nvPr/>
+        </p:nvSpPr>
+        <p:spPr>
+          <a:xfrm>
+            <a:off x="4838052" y="3981280"/>
+            <a:ext cx="1443037" cy="772083"/>
+          </a:xfrm>
+          <a:prstGeom prst="roundRect">
+            <a:avLst/>
+          </a:prstGeom>
+          <a:noFill/>
+          <a:ln w="12700">
+            <a:solidFill>
+              <a:schemeClr val="tx1"/>
+            </a:solidFill>
+          </a:ln>
+        </p:spPr>
+        <p:style>
+          <a:lnRef idx="2">
+            <a:schemeClr val="accent1">
+              <a:shade val="50000"/>
+            </a:schemeClr>
+          </a:lnRef>
+          <a:fillRef idx="1">
+            <a:schemeClr val="accent1"/>
+          </a:fillRef>
+          <a:effectRef idx="0">
+            <a:schemeClr val="accent1"/>
+          </a:effectRef>
+          <a:fontRef idx="minor">
+            <a:schemeClr val="lt1"/>
+          </a:fontRef>
+        </p:style>
+        <p:txBody>
+          <a:bodyPr rot="0" spcFirstLastPara="0" vertOverflow="overflow" horzOverflow="overflow" vert="horz" wrap="square" lIns="91440" tIns="45720" rIns="91440" bIns="45720" numCol="1" spcCol="0" rtlCol="0" fromWordArt="0" anchor="ctr" anchorCtr="0" forceAA="0" compatLnSpc="1">
+            <a:prstTxWarp prst="textNoShape">
+              <a:avLst/>
+            </a:prstTxWarp>
+            <a:noAutofit/>
+          </a:bodyPr>
+          <a:lstStyle/>
+          <a:p>
+            <a:pPr algn="ctr"/>
+            <a:r>
+              <a:rPr lang="zh-CN" altLang="en-US" dirty="0">
+                <a:solidFill>
+                  <a:schemeClr val="tx1"/>
+                </a:solidFill>
+              </a:rPr>
+              <a:t>知识源扩增</a:t>
+            </a:r>
+            <a:endParaRPr lang="en-US" dirty="0">
+              <a:solidFill>
+                <a:schemeClr val="tx1"/>
+              </a:solidFill>
+            </a:endParaRPr>
+          </a:p>
+        </p:txBody>
+      </p:sp>
+      <p:sp>
+        <p:nvSpPr>
+          <p:cNvPr id="9" name="Rounded Rectangle 8">
+            <a:extLst>
+              <a:ext uri="{FF2B5EF4-FFF2-40B4-BE49-F238E27FC236}">
+                <a16:creationId xmlns:a16="http://schemas.microsoft.com/office/drawing/2014/main" id="{5941C809-CC94-8F48-B041-F56A69655256}"/>
+              </a:ext>
+            </a:extLst>
+          </p:cNvPr>
+          <p:cNvSpPr/>
+          <p:nvPr/>
+        </p:nvSpPr>
+        <p:spPr>
+          <a:xfrm>
+            <a:off x="7333886" y="2370272"/>
+            <a:ext cx="1443037" cy="772083"/>
+          </a:xfrm>
+          <a:prstGeom prst="roundRect">
+            <a:avLst/>
+          </a:prstGeom>
+          <a:noFill/>
+          <a:ln w="12700">
+            <a:solidFill>
+              <a:schemeClr val="tx1"/>
+            </a:solidFill>
+          </a:ln>
+        </p:spPr>
+        <p:style>
+          <a:lnRef idx="2">
+            <a:schemeClr val="accent1">
+              <a:shade val="50000"/>
+            </a:schemeClr>
+          </a:lnRef>
+          <a:fillRef idx="1">
+            <a:schemeClr val="accent1"/>
+          </a:fillRef>
+          <a:effectRef idx="0">
+            <a:schemeClr val="accent1"/>
+          </a:effectRef>
+          <a:fontRef idx="minor">
+            <a:schemeClr val="lt1"/>
+          </a:fontRef>
+        </p:style>
+        <p:txBody>
+          <a:bodyPr rot="0" spcFirstLastPara="0" vertOverflow="overflow" horzOverflow="overflow" vert="horz" wrap="square" lIns="91440" tIns="45720" rIns="91440" bIns="45720" numCol="1" spcCol="0" rtlCol="0" fromWordArt="0" anchor="ctr" anchorCtr="0" forceAA="0" compatLnSpc="1">
+            <a:prstTxWarp prst="textNoShape">
+              <a:avLst/>
+            </a:prstTxWarp>
+            <a:noAutofit/>
+          </a:bodyPr>
+          <a:lstStyle/>
+          <a:p>
+            <a:pPr algn="ctr"/>
+            <a:r>
+              <a:rPr lang="zh-CN" altLang="en-US" dirty="0">
+                <a:solidFill>
+                  <a:schemeClr val="tx1"/>
+                </a:solidFill>
+              </a:rPr>
+              <a:t>置信度选择</a:t>
+            </a:r>
+            <a:endParaRPr lang="en-US" dirty="0">
+              <a:solidFill>
+                <a:schemeClr val="tx1"/>
+              </a:solidFill>
+            </a:endParaRPr>
+          </a:p>
+        </p:txBody>
+      </p:sp>
+      <p:sp>
+        <p:nvSpPr>
+          <p:cNvPr id="10" name="Rounded Rectangle 9">
+            <a:extLst>
+              <a:ext uri="{FF2B5EF4-FFF2-40B4-BE49-F238E27FC236}">
+                <a16:creationId xmlns:a16="http://schemas.microsoft.com/office/drawing/2014/main" id="{7DF11496-0148-7747-A154-0F2FF924F202}"/>
+              </a:ext>
+            </a:extLst>
+          </p:cNvPr>
+          <p:cNvSpPr/>
+          <p:nvPr/>
+        </p:nvSpPr>
+        <p:spPr>
+          <a:xfrm>
+            <a:off x="9530709" y="2922425"/>
+            <a:ext cx="1443037" cy="772083"/>
+          </a:xfrm>
+          <a:prstGeom prst="roundRect">
+            <a:avLst/>
+          </a:prstGeom>
+          <a:noFill/>
+          <a:ln w="12700">
+            <a:solidFill>
+              <a:schemeClr val="tx1"/>
+            </a:solidFill>
+          </a:ln>
+        </p:spPr>
+        <p:style>
+          <a:lnRef idx="2">
+            <a:schemeClr val="accent1">
+              <a:shade val="50000"/>
+            </a:schemeClr>
+          </a:lnRef>
+          <a:fillRef idx="1">
+            <a:schemeClr val="accent1"/>
+          </a:fillRef>
+          <a:effectRef idx="0">
+            <a:schemeClr val="accent1"/>
+          </a:effectRef>
+          <a:fontRef idx="minor">
+            <a:schemeClr val="lt1"/>
+          </a:fontRef>
+        </p:style>
+        <p:txBody>
+          <a:bodyPr rot="0" spcFirstLastPara="0" vertOverflow="overflow" horzOverflow="overflow" vert="horz" wrap="square" lIns="91440" tIns="45720" rIns="91440" bIns="45720" numCol="1" spcCol="0" rtlCol="0" fromWordArt="0" anchor="ctr" anchorCtr="0" forceAA="0" compatLnSpc="1">
+            <a:prstTxWarp prst="textNoShape">
+              <a:avLst/>
+            </a:prstTxWarp>
+            <a:noAutofit/>
+          </a:bodyPr>
+          <a:lstStyle/>
+          <a:p>
+            <a:pPr algn="ctr"/>
+            <a:r>
+              <a:rPr lang="zh-CN" altLang="en-US" dirty="0">
+                <a:solidFill>
+                  <a:schemeClr val="tx1"/>
+                </a:solidFill>
+              </a:rPr>
+              <a:t>补丁扩增</a:t>
+            </a:r>
+            <a:endParaRPr lang="en-US" dirty="0">
+              <a:solidFill>
+                <a:schemeClr val="tx1"/>
+              </a:solidFill>
+            </a:endParaRPr>
+          </a:p>
+        </p:txBody>
+      </p:sp>
+      <p:cxnSp>
+        <p:nvCxnSpPr>
+          <p:cNvPr id="17" name="Straight Arrow Connector 16">
+            <a:extLst>
+              <a:ext uri="{FF2B5EF4-FFF2-40B4-BE49-F238E27FC236}">
+                <a16:creationId xmlns:a16="http://schemas.microsoft.com/office/drawing/2014/main" id="{AB205991-A20F-B043-9C33-F59E76B45C43}"/>
+              </a:ext>
+            </a:extLst>
+          </p:cNvPr>
+          <p:cNvCxnSpPr>
+            <a:cxnSpLocks/>
+          </p:cNvCxnSpPr>
+          <p:nvPr/>
+        </p:nvCxnSpPr>
+        <p:spPr>
+          <a:xfrm>
+            <a:off x="6567475" y="3308467"/>
+            <a:ext cx="386485" cy="0"/>
+          </a:xfrm>
+          <a:prstGeom prst="straightConnector1">
+            <a:avLst/>
+          </a:prstGeom>
+          <a:ln w="12700">
+            <a:solidFill>
+              <a:schemeClr val="tx1"/>
+            </a:solidFill>
+            <a:headEnd type="none"/>
+            <a:tailEnd type="arrow"/>
+          </a:ln>
+        </p:spPr>
+        <p:style>
+          <a:lnRef idx="1">
+            <a:schemeClr val="accent1"/>
+          </a:lnRef>
+          <a:fillRef idx="0">
+            <a:schemeClr val="accent1"/>
+          </a:fillRef>
+          <a:effectRef idx="0">
+            <a:schemeClr val="accent1"/>
+          </a:effectRef>
+          <a:fontRef idx="minor">
+            <a:schemeClr val="tx1"/>
+          </a:fontRef>
+        </p:style>
+      </p:cxnSp>
+      <p:cxnSp>
+        <p:nvCxnSpPr>
+          <p:cNvPr id="18" name="Straight Arrow Connector 17">
+            <a:extLst>
+              <a:ext uri="{FF2B5EF4-FFF2-40B4-BE49-F238E27FC236}">
+                <a16:creationId xmlns:a16="http://schemas.microsoft.com/office/drawing/2014/main" id="{ACCEAD85-B426-E445-B3BD-C01C05869C95}"/>
+              </a:ext>
+            </a:extLst>
+          </p:cNvPr>
+          <p:cNvCxnSpPr>
+            <a:cxnSpLocks/>
+          </p:cNvCxnSpPr>
+          <p:nvPr/>
+        </p:nvCxnSpPr>
+        <p:spPr>
+          <a:xfrm>
+            <a:off x="9095400" y="3317144"/>
+            <a:ext cx="386485" cy="0"/>
+          </a:xfrm>
+          <a:prstGeom prst="straightConnector1">
+            <a:avLst/>
+          </a:prstGeom>
+          <a:ln w="12700">
+            <a:solidFill>
+              <a:schemeClr val="tx1"/>
+            </a:solidFill>
+            <a:headEnd type="none"/>
+            <a:tailEnd type="arrow"/>
+          </a:ln>
+        </p:spPr>
+        <p:style>
+          <a:lnRef idx="1">
+            <a:schemeClr val="accent1"/>
+          </a:lnRef>
+          <a:fillRef idx="0">
+            <a:schemeClr val="accent1"/>
+          </a:fillRef>
+          <a:effectRef idx="0">
+            <a:schemeClr val="accent1"/>
+          </a:effectRef>
+          <a:fontRef idx="minor">
+            <a:schemeClr val="tx1"/>
+          </a:fontRef>
+        </p:style>
+      </p:cxnSp>
+      <p:cxnSp>
+        <p:nvCxnSpPr>
+          <p:cNvPr id="19" name="Straight Arrow Connector 18">
+            <a:extLst>
+              <a:ext uri="{FF2B5EF4-FFF2-40B4-BE49-F238E27FC236}">
+                <a16:creationId xmlns:a16="http://schemas.microsoft.com/office/drawing/2014/main" id="{344286AB-BE91-0F47-BE59-A3DB94C27F41}"/>
+              </a:ext>
+            </a:extLst>
+          </p:cNvPr>
+          <p:cNvCxnSpPr>
+            <a:cxnSpLocks/>
+          </p:cNvCxnSpPr>
+          <p:nvPr/>
+        </p:nvCxnSpPr>
+        <p:spPr>
+          <a:xfrm>
+            <a:off x="11043934" y="3325166"/>
+            <a:ext cx="386485" cy="0"/>
+          </a:xfrm>
+          <a:prstGeom prst="straightConnector1">
+            <a:avLst/>
+          </a:prstGeom>
+          <a:ln w="12700">
+            <a:solidFill>
+              <a:schemeClr val="tx1"/>
+            </a:solidFill>
+            <a:headEnd type="none"/>
+            <a:tailEnd type="arrow"/>
+          </a:ln>
+        </p:spPr>
+        <p:style>
+          <a:lnRef idx="1">
+            <a:schemeClr val="accent1"/>
+          </a:lnRef>
+          <a:fillRef idx="0">
+            <a:schemeClr val="accent1"/>
+          </a:fillRef>
+          <a:effectRef idx="0">
+            <a:schemeClr val="accent1"/>
+          </a:effectRef>
+          <a:fontRef idx="minor">
+            <a:schemeClr val="tx1"/>
+          </a:fontRef>
+        </p:style>
+      </p:cxnSp>
+      <p:pic>
+        <p:nvPicPr>
+          <p:cNvPr id="27" name="Picture 26">
+            <a:extLst>
+              <a:ext uri="{FF2B5EF4-FFF2-40B4-BE49-F238E27FC236}">
+                <a16:creationId xmlns:a16="http://schemas.microsoft.com/office/drawing/2014/main" id="{7ACB9588-60AF-5242-9FF5-19BA74A399C1}"/>
+              </a:ext>
+            </a:extLst>
+          </p:cNvPr>
+          <p:cNvPicPr>
+            <a:picLocks noChangeAspect="1"/>
+          </p:cNvPicPr>
+          <p:nvPr/>
+        </p:nvPicPr>
+        <p:blipFill>
+          <a:blip r:embed="rId2"/>
+          <a:stretch>
+            <a:fillRect/>
+          </a:stretch>
+        </p:blipFill>
+        <p:spPr>
+          <a:xfrm>
+            <a:off x="3807984" y="4129357"/>
+            <a:ext cx="751415" cy="652327"/>
+          </a:xfrm>
+          <a:prstGeom prst="rect">
+            <a:avLst/>
+          </a:prstGeom>
+        </p:spPr>
+      </p:pic>
+      <p:pic>
+        <p:nvPicPr>
+          <p:cNvPr id="28" name="Picture 27">
+            <a:extLst>
+              <a:ext uri="{FF2B5EF4-FFF2-40B4-BE49-F238E27FC236}">
+                <a16:creationId xmlns:a16="http://schemas.microsoft.com/office/drawing/2014/main" id="{7E03FE1C-6DAF-D84E-912F-A2B4A9E83C60}"/>
+              </a:ext>
+            </a:extLst>
+          </p:cNvPr>
+          <p:cNvPicPr>
+            <a:picLocks noChangeAspect="1"/>
+          </p:cNvPicPr>
+          <p:nvPr/>
+        </p:nvPicPr>
+        <p:blipFill>
+          <a:blip r:embed="rId2"/>
+          <a:stretch>
+            <a:fillRect/>
+          </a:stretch>
+        </p:blipFill>
+        <p:spPr>
+          <a:xfrm>
+            <a:off x="9876519" y="1952487"/>
+            <a:ext cx="751415" cy="652327"/>
+          </a:xfrm>
+          <a:prstGeom prst="rect">
+            <a:avLst/>
+          </a:prstGeom>
+        </p:spPr>
+      </p:pic>
+      <p:sp>
+        <p:nvSpPr>
+          <p:cNvPr id="41" name="Down Arrow 40">
+            <a:extLst>
+              <a:ext uri="{FF2B5EF4-FFF2-40B4-BE49-F238E27FC236}">
+                <a16:creationId xmlns:a16="http://schemas.microsoft.com/office/drawing/2014/main" id="{B9D1C2AB-490D-EF47-9803-31A15028E9CC}"/>
+              </a:ext>
+            </a:extLst>
+          </p:cNvPr>
+          <p:cNvSpPr/>
+          <p:nvPr/>
+        </p:nvSpPr>
+        <p:spPr>
+          <a:xfrm rot="16200000">
+            <a:off x="4478085" y="4255025"/>
+            <a:ext cx="257410" cy="224590"/>
+          </a:xfrm>
+          <a:prstGeom prst="downArrow">
+            <a:avLst/>
+          </a:prstGeom>
+          <a:noFill/>
+          <a:ln w="12700">
+            <a:solidFill>
+              <a:schemeClr val="tx1"/>
+            </a:solidFill>
+          </a:ln>
+        </p:spPr>
+        <p:style>
+          <a:lnRef idx="2">
+            <a:schemeClr val="accent1">
+              <a:shade val="50000"/>
+            </a:schemeClr>
+          </a:lnRef>
+          <a:fillRef idx="1">
+            <a:schemeClr val="accent1"/>
+          </a:fillRef>
+          <a:effectRef idx="0">
+            <a:schemeClr val="accent1"/>
+          </a:effectRef>
+          <a:fontRef idx="minor">
+            <a:schemeClr val="lt1"/>
+          </a:fontRef>
+        </p:style>
+        <p:txBody>
+          <a:bodyPr rtlCol="0" anchor="ctr"/>
+          <a:lstStyle/>
+          <a:p>
+            <a:pPr algn="ctr"/>
+            <a:endParaRPr lang="en-US"/>
+          </a:p>
+        </p:txBody>
+      </p:sp>
+      <p:sp>
+        <p:nvSpPr>
+          <p:cNvPr id="42" name="Down Arrow 41">
+            <a:extLst>
+              <a:ext uri="{FF2B5EF4-FFF2-40B4-BE49-F238E27FC236}">
+                <a16:creationId xmlns:a16="http://schemas.microsoft.com/office/drawing/2014/main" id="{1E8FEFBB-8B78-A449-8BE5-359EB349C4C7}"/>
+              </a:ext>
+            </a:extLst>
+          </p:cNvPr>
+          <p:cNvSpPr/>
+          <p:nvPr/>
+        </p:nvSpPr>
+        <p:spPr>
+          <a:xfrm>
+            <a:off x="10129538" y="2633669"/>
+            <a:ext cx="257410" cy="224590"/>
+          </a:xfrm>
+          <a:prstGeom prst="downArrow">
+            <a:avLst/>
+          </a:prstGeom>
+          <a:noFill/>
+          <a:ln w="12700">
+            <a:solidFill>
+              <a:schemeClr val="tx1"/>
+            </a:solidFill>
+          </a:ln>
+        </p:spPr>
+        <p:style>
+          <a:lnRef idx="2">
+            <a:schemeClr val="accent1">
+              <a:shade val="50000"/>
+            </a:schemeClr>
+          </a:lnRef>
+          <a:fillRef idx="1">
+            <a:schemeClr val="accent1"/>
+          </a:fillRef>
+          <a:effectRef idx="0">
+            <a:schemeClr val="accent1"/>
+          </a:effectRef>
+          <a:fontRef idx="minor">
+            <a:schemeClr val="lt1"/>
+          </a:fontRef>
+        </p:style>
+        <p:txBody>
+          <a:bodyPr rtlCol="0" anchor="ctr"/>
+          <a:lstStyle/>
+          <a:p>
+            <a:pPr algn="ctr"/>
+            <a:endParaRPr lang="en-US"/>
+          </a:p>
+        </p:txBody>
+      </p:sp>
+      <p:sp>
+        <p:nvSpPr>
+          <p:cNvPr id="45" name="Rectangle 44">
+            <a:extLst>
+              <a:ext uri="{FF2B5EF4-FFF2-40B4-BE49-F238E27FC236}">
+                <a16:creationId xmlns:a16="http://schemas.microsoft.com/office/drawing/2014/main" id="{9D525EDA-9974-8C42-B90C-48E0F95BD84A}"/>
+              </a:ext>
+            </a:extLst>
+          </p:cNvPr>
+          <p:cNvSpPr/>
+          <p:nvPr/>
+        </p:nvSpPr>
+        <p:spPr>
+          <a:xfrm>
+            <a:off x="4520089" y="4844764"/>
+            <a:ext cx="2031325" cy="369332"/>
+          </a:xfrm>
+          <a:prstGeom prst="rect">
+            <a:avLst/>
+          </a:prstGeom>
+        </p:spPr>
+        <p:txBody>
+          <a:bodyPr wrap="none">
+            <a:spAutoFit/>
+          </a:bodyPr>
+          <a:lstStyle/>
+          <a:p>
+            <a:pPr algn="ctr"/>
+            <a:r>
+              <a:rPr lang="zh-CN" altLang="en-US" dirty="0"/>
+              <a:t>多源信息网络构建</a:t>
+            </a:r>
+            <a:endParaRPr lang="en-US" dirty="0"/>
+          </a:p>
+        </p:txBody>
+      </p:sp>
+      <p:sp>
+        <p:nvSpPr>
+          <p:cNvPr id="33" name="Rounded Rectangle 42">
+            <a:extLst>
+              <a:ext uri="{FF2B5EF4-FFF2-40B4-BE49-F238E27FC236}">
+                <a16:creationId xmlns:a16="http://schemas.microsoft.com/office/drawing/2014/main" id="{92F9E82E-09E9-3F4A-9A36-EA5F300C9863}"/>
+              </a:ext>
+            </a:extLst>
+          </p:cNvPr>
+          <p:cNvSpPr/>
+          <p:nvPr/>
+        </p:nvSpPr>
+        <p:spPr>
+          <a:xfrm>
+            <a:off x="7074232" y="1716011"/>
+            <a:ext cx="1962349" cy="3548774"/>
+          </a:xfrm>
+          <a:prstGeom prst="roundRect">
+            <a:avLst>
+              <a:gd name="adj" fmla="val 7028"/>
+            </a:avLst>
+          </a:prstGeom>
+          <a:noFill/>
+          <a:ln w="12700">
+            <a:solidFill>
+              <a:schemeClr val="tx1"/>
+            </a:solidFill>
+            <a:prstDash val="dash"/>
+          </a:ln>
+        </p:spPr>
+        <p:style>
+          <a:lnRef idx="2">
+            <a:schemeClr val="accent1">
+              <a:shade val="50000"/>
+            </a:schemeClr>
+          </a:lnRef>
+          <a:fillRef idx="1">
+            <a:schemeClr val="accent1"/>
+          </a:fillRef>
+          <a:effectRef idx="0">
+            <a:schemeClr val="accent1"/>
+          </a:effectRef>
+          <a:fontRef idx="minor">
+            <a:schemeClr val="lt1"/>
+          </a:fontRef>
+        </p:style>
+        <p:txBody>
+          <a:bodyPr rtlCol="0" anchor="ctr"/>
+          <a:lstStyle/>
+          <a:p>
+            <a:pPr algn="ctr"/>
+            <a:endParaRPr lang="en-US"/>
+          </a:p>
+        </p:txBody>
+      </p:sp>
+      <p:sp>
+        <p:nvSpPr>
+          <p:cNvPr id="37" name="Rounded Rectangle 7">
+            <a:extLst>
+              <a:ext uri="{FF2B5EF4-FFF2-40B4-BE49-F238E27FC236}">
+                <a16:creationId xmlns:a16="http://schemas.microsoft.com/office/drawing/2014/main" id="{55975C21-E97F-D245-A2DD-A39DAFDFCCD6}"/>
+              </a:ext>
+            </a:extLst>
+          </p:cNvPr>
+          <p:cNvSpPr/>
+          <p:nvPr/>
+        </p:nvSpPr>
+        <p:spPr>
+          <a:xfrm>
+            <a:off x="7333886" y="3478309"/>
+            <a:ext cx="1443037" cy="772083"/>
+          </a:xfrm>
+          <a:prstGeom prst="roundRect">
+            <a:avLst/>
+          </a:prstGeom>
+          <a:noFill/>
+          <a:ln w="12700">
+            <a:solidFill>
+              <a:schemeClr val="tx1"/>
+            </a:solidFill>
+          </a:ln>
+        </p:spPr>
+        <p:style>
+          <a:lnRef idx="2">
+            <a:schemeClr val="accent1">
+              <a:shade val="50000"/>
+            </a:schemeClr>
+          </a:lnRef>
+          <a:fillRef idx="1">
+            <a:schemeClr val="accent1"/>
+          </a:fillRef>
+          <a:effectRef idx="0">
+            <a:schemeClr val="accent1"/>
+          </a:effectRef>
+          <a:fontRef idx="minor">
+            <a:schemeClr val="lt1"/>
+          </a:fontRef>
+        </p:style>
+        <p:txBody>
+          <a:bodyPr rot="0" spcFirstLastPara="0" vertOverflow="overflow" horzOverflow="overflow" vert="horz" wrap="square" lIns="91440" tIns="45720" rIns="91440" bIns="45720" numCol="1" spcCol="0" rtlCol="0" fromWordArt="0" anchor="ctr" anchorCtr="0" forceAA="0" compatLnSpc="1">
+            <a:prstTxWarp prst="textNoShape">
+              <a:avLst/>
+            </a:prstTxWarp>
+            <a:noAutofit/>
+          </a:bodyPr>
+          <a:lstStyle/>
+          <a:p>
+            <a:pPr algn="ctr"/>
+            <a:r>
+              <a:rPr lang="zh-CN" altLang="en-US" dirty="0">
+                <a:solidFill>
+                  <a:schemeClr val="tx1"/>
+                </a:solidFill>
+              </a:rPr>
+              <a:t>连通度选择</a:t>
+            </a:r>
+            <a:endParaRPr lang="en-US" dirty="0">
+              <a:solidFill>
+                <a:schemeClr val="tx1"/>
+              </a:solidFill>
+            </a:endParaRPr>
+          </a:p>
+        </p:txBody>
+      </p:sp>
+      <p:sp>
+        <p:nvSpPr>
+          <p:cNvPr id="38" name="Rectangle 44">
+            <a:extLst>
+              <a:ext uri="{FF2B5EF4-FFF2-40B4-BE49-F238E27FC236}">
+                <a16:creationId xmlns:a16="http://schemas.microsoft.com/office/drawing/2014/main" id="{8C85AA31-A07A-A549-8EB5-9FB13EBCE02F}"/>
+              </a:ext>
+            </a:extLst>
+          </p:cNvPr>
+          <p:cNvSpPr/>
+          <p:nvPr/>
+        </p:nvSpPr>
+        <p:spPr>
+          <a:xfrm>
+            <a:off x="7270577" y="4844764"/>
+            <a:ext cx="1569660" cy="369332"/>
+          </a:xfrm>
+          <a:prstGeom prst="rect">
+            <a:avLst/>
+          </a:prstGeom>
+        </p:spPr>
+        <p:txBody>
+          <a:bodyPr wrap="none">
+            <a:spAutoFit/>
+          </a:bodyPr>
+          <a:lstStyle/>
+          <a:p>
+            <a:pPr algn="ctr"/>
+            <a:r>
+              <a:rPr lang="zh-CN" altLang="en-US" dirty="0"/>
+              <a:t>补丁节点精选</a:t>
+            </a:r>
+            <a:endParaRPr lang="en-US" altLang="zh-CN" dirty="0"/>
+          </a:p>
+        </p:txBody>
+      </p:sp>
+      <p:pic>
+        <p:nvPicPr>
+          <p:cNvPr id="46" name="Picture 22">
+            <a:extLst>
+              <a:ext uri="{FF2B5EF4-FFF2-40B4-BE49-F238E27FC236}">
+                <a16:creationId xmlns:a16="http://schemas.microsoft.com/office/drawing/2014/main" id="{FAF5A15D-766C-0D41-83C0-1BC10D2BF7EB}"/>
+              </a:ext>
+            </a:extLst>
+          </p:cNvPr>
+          <p:cNvPicPr>
+            <a:picLocks noChangeAspect="1"/>
+          </p:cNvPicPr>
+          <p:nvPr/>
+        </p:nvPicPr>
+        <p:blipFill>
+          <a:blip r:embed="rId3"/>
+          <a:stretch>
+            <a:fillRect/>
+          </a:stretch>
+        </p:blipFill>
+        <p:spPr>
+          <a:xfrm>
+            <a:off x="4372570" y="1107129"/>
+            <a:ext cx="678389" cy="321259"/>
+          </a:xfrm>
+          <a:prstGeom prst="rect">
+            <a:avLst/>
+          </a:prstGeom>
+        </p:spPr>
+      </p:pic>
+      <p:pic>
+        <p:nvPicPr>
+          <p:cNvPr id="47" name="Picture 31">
+            <a:extLst>
+              <a:ext uri="{FF2B5EF4-FFF2-40B4-BE49-F238E27FC236}">
+                <a16:creationId xmlns:a16="http://schemas.microsoft.com/office/drawing/2014/main" id="{38A28C28-078F-F04E-BB32-4BC013C87DE5}"/>
+              </a:ext>
+            </a:extLst>
+          </p:cNvPr>
+          <p:cNvPicPr>
+            <a:picLocks noChangeAspect="1"/>
+          </p:cNvPicPr>
+          <p:nvPr/>
+        </p:nvPicPr>
+        <p:blipFill>
+          <a:blip r:embed="rId4"/>
+          <a:stretch>
+            <a:fillRect/>
+          </a:stretch>
+        </p:blipFill>
+        <p:spPr>
+          <a:xfrm>
+            <a:off x="5223642" y="868776"/>
+            <a:ext cx="542991" cy="701711"/>
+          </a:xfrm>
+          <a:prstGeom prst="rect">
+            <a:avLst/>
+          </a:prstGeom>
+        </p:spPr>
+      </p:pic>
+      <p:pic>
+        <p:nvPicPr>
+          <p:cNvPr id="48" name="Picture 33">
+            <a:extLst>
+              <a:ext uri="{FF2B5EF4-FFF2-40B4-BE49-F238E27FC236}">
+                <a16:creationId xmlns:a16="http://schemas.microsoft.com/office/drawing/2014/main" id="{E5ECB1DC-40E8-7E4B-A624-C142B97C3A47}"/>
+              </a:ext>
+            </a:extLst>
+          </p:cNvPr>
+          <p:cNvPicPr>
+            <a:picLocks noChangeAspect="1"/>
+          </p:cNvPicPr>
+          <p:nvPr/>
+        </p:nvPicPr>
+        <p:blipFill>
+          <a:blip r:embed="rId5"/>
+          <a:stretch>
+            <a:fillRect/>
+          </a:stretch>
+        </p:blipFill>
+        <p:spPr>
+          <a:xfrm>
+            <a:off x="5939316" y="874783"/>
+            <a:ext cx="678389" cy="689695"/>
+          </a:xfrm>
+          <a:prstGeom prst="rect">
+            <a:avLst/>
+          </a:prstGeom>
+        </p:spPr>
+      </p:pic>
+      <p:sp>
+        <p:nvSpPr>
+          <p:cNvPr id="49" name="Down Arrow 39">
+            <a:extLst>
+              <a:ext uri="{FF2B5EF4-FFF2-40B4-BE49-F238E27FC236}">
+                <a16:creationId xmlns:a16="http://schemas.microsoft.com/office/drawing/2014/main" id="{9399E320-AAF6-DA4B-BF70-263CB0B35B96}"/>
+              </a:ext>
+            </a:extLst>
+          </p:cNvPr>
+          <p:cNvSpPr/>
+          <p:nvPr/>
+        </p:nvSpPr>
+        <p:spPr>
+          <a:xfrm>
+            <a:off x="5366432" y="1589524"/>
+            <a:ext cx="257410" cy="224590"/>
+          </a:xfrm>
+          <a:prstGeom prst="downArrow">
+            <a:avLst/>
+          </a:prstGeom>
+          <a:noFill/>
+          <a:ln w="12700">
+            <a:solidFill>
+              <a:schemeClr val="tx1"/>
+            </a:solidFill>
+          </a:ln>
+        </p:spPr>
+        <p:style>
+          <a:lnRef idx="2">
+            <a:schemeClr val="accent1">
+              <a:shade val="50000"/>
+            </a:schemeClr>
+          </a:lnRef>
+          <a:fillRef idx="1">
+            <a:schemeClr val="accent1"/>
+          </a:fillRef>
+          <a:effectRef idx="0">
+            <a:schemeClr val="accent1"/>
+          </a:effectRef>
+          <a:fontRef idx="minor">
+            <a:schemeClr val="lt1"/>
+          </a:fontRef>
+        </p:style>
+        <p:txBody>
+          <a:bodyPr rtlCol="0" anchor="ctr"/>
+          <a:lstStyle/>
+          <a:p>
+            <a:pPr algn="ctr"/>
+            <a:endParaRPr lang="en-US"/>
+          </a:p>
+        </p:txBody>
+      </p:sp>
+      <p:cxnSp>
+        <p:nvCxnSpPr>
+          <p:cNvPr id="50" name="Straight Arrow Connector 16">
+            <a:extLst>
+              <a:ext uri="{FF2B5EF4-FFF2-40B4-BE49-F238E27FC236}">
+                <a16:creationId xmlns:a16="http://schemas.microsoft.com/office/drawing/2014/main" id="{119CBFA5-DAAD-B041-AD3E-18905253A2B1}"/>
+              </a:ext>
+            </a:extLst>
+          </p:cNvPr>
+          <p:cNvCxnSpPr>
+            <a:cxnSpLocks/>
+          </p:cNvCxnSpPr>
+          <p:nvPr/>
+        </p:nvCxnSpPr>
+        <p:spPr>
+          <a:xfrm>
+            <a:off x="4084968" y="3308467"/>
+            <a:ext cx="386485" cy="0"/>
+          </a:xfrm>
+          <a:prstGeom prst="straightConnector1">
+            <a:avLst/>
+          </a:prstGeom>
+          <a:ln w="12700">
+            <a:solidFill>
+              <a:schemeClr val="tx1"/>
+            </a:solidFill>
+            <a:headEnd type="none"/>
+            <a:tailEnd type="arrow"/>
+          </a:ln>
+        </p:spPr>
+        <p:style>
+          <a:lnRef idx="1">
+            <a:schemeClr val="accent1"/>
+          </a:lnRef>
+          <a:fillRef idx="0">
+            <a:schemeClr val="accent1"/>
+          </a:fillRef>
+          <a:effectRef idx="0">
+            <a:schemeClr val="accent1"/>
+          </a:effectRef>
+          <a:fontRef idx="minor">
+            <a:schemeClr val="tx1"/>
+          </a:fontRef>
+        </p:style>
+      </p:cxnSp>
+    </p:spTree>
+    <p:extLst>
+      <p:ext uri="{BB962C8B-B14F-4D97-AF65-F5344CB8AC3E}">
+        <p14:creationId xmlns:p14="http://schemas.microsoft.com/office/powerpoint/2010/main" val="252639368"/>
+      </p:ext>
+    </p:extLst>
+  </p:cSld>
+  <p:clrMapOvr>
+    <a:masterClrMapping/>
+  </p:clrMapOvr>
+</p:sld>
+</file>
+
 <file path=ppt/theme/theme1.xml><?xml version="1.0" encoding="utf-8"?>
 <a:theme xmlns:a="http://schemas.openxmlformats.org/drawingml/2006/main" name="Office Theme">
   <a:themeElements>

</xml_diff>